<commit_message>
Added sample java implementation of section registration
</commit_message>
<xml_diff>
--- a/week_12/Thread Synchronization.pptx
+++ b/week_12/Thread Synchronization.pptx
@@ -212,7 +212,7 @@
           <a:p>
             <a:fld id="{F666E1FD-E7A0-497B-BBC0-740BAAC97C64}" type="datetimeFigureOut">
               <a:rPr lang="en-PH" smtClean="0"/>
-              <a:t>28/02/2023</a:t>
+              <a:t>06/03/2023</a:t>
             </a:fld>
             <a:endParaRPr lang="en-PH"/>
           </a:p>
@@ -1301,7 +1301,7 @@
           <a:p>
             <a:fld id="{0CCF0B81-6BD8-4C65-9459-815598C5F1F4}" type="datetimeFigureOut">
               <a:rPr lang="en-PH" smtClean="0"/>
-              <a:t>28/02/2023</a:t>
+              <a:t>06/03/2023</a:t>
             </a:fld>
             <a:endParaRPr lang="en-PH"/>
           </a:p>
@@ -1501,7 +1501,7 @@
           <a:p>
             <a:fld id="{0CCF0B81-6BD8-4C65-9459-815598C5F1F4}" type="datetimeFigureOut">
               <a:rPr lang="en-PH" smtClean="0"/>
-              <a:t>28/02/2023</a:t>
+              <a:t>06/03/2023</a:t>
             </a:fld>
             <a:endParaRPr lang="en-PH"/>
           </a:p>
@@ -1711,7 +1711,7 @@
           <a:p>
             <a:fld id="{0CCF0B81-6BD8-4C65-9459-815598C5F1F4}" type="datetimeFigureOut">
               <a:rPr lang="en-PH" smtClean="0"/>
-              <a:t>28/02/2023</a:t>
+              <a:t>06/03/2023</a:t>
             </a:fld>
             <a:endParaRPr lang="en-PH"/>
           </a:p>
@@ -1911,7 +1911,7 @@
           <a:p>
             <a:fld id="{0CCF0B81-6BD8-4C65-9459-815598C5F1F4}" type="datetimeFigureOut">
               <a:rPr lang="en-PH" smtClean="0"/>
-              <a:t>28/02/2023</a:t>
+              <a:t>06/03/2023</a:t>
             </a:fld>
             <a:endParaRPr lang="en-PH"/>
           </a:p>
@@ -2187,7 +2187,7 @@
           <a:p>
             <a:fld id="{0CCF0B81-6BD8-4C65-9459-815598C5F1F4}" type="datetimeFigureOut">
               <a:rPr lang="en-PH" smtClean="0"/>
-              <a:t>28/02/2023</a:t>
+              <a:t>06/03/2023</a:t>
             </a:fld>
             <a:endParaRPr lang="en-PH"/>
           </a:p>
@@ -2455,7 +2455,7 @@
           <a:p>
             <a:fld id="{0CCF0B81-6BD8-4C65-9459-815598C5F1F4}" type="datetimeFigureOut">
               <a:rPr lang="en-PH" smtClean="0"/>
-              <a:t>28/02/2023</a:t>
+              <a:t>06/03/2023</a:t>
             </a:fld>
             <a:endParaRPr lang="en-PH"/>
           </a:p>
@@ -2870,7 +2870,7 @@
           <a:p>
             <a:fld id="{0CCF0B81-6BD8-4C65-9459-815598C5F1F4}" type="datetimeFigureOut">
               <a:rPr lang="en-PH" smtClean="0"/>
-              <a:t>28/02/2023</a:t>
+              <a:t>06/03/2023</a:t>
             </a:fld>
             <a:endParaRPr lang="en-PH"/>
           </a:p>
@@ -3012,7 +3012,7 @@
           <a:p>
             <a:fld id="{0CCF0B81-6BD8-4C65-9459-815598C5F1F4}" type="datetimeFigureOut">
               <a:rPr lang="en-PH" smtClean="0"/>
-              <a:t>28/02/2023</a:t>
+              <a:t>06/03/2023</a:t>
             </a:fld>
             <a:endParaRPr lang="en-PH"/>
           </a:p>
@@ -3125,7 +3125,7 @@
           <a:p>
             <a:fld id="{0CCF0B81-6BD8-4C65-9459-815598C5F1F4}" type="datetimeFigureOut">
               <a:rPr lang="en-PH" smtClean="0"/>
-              <a:t>28/02/2023</a:t>
+              <a:t>06/03/2023</a:t>
             </a:fld>
             <a:endParaRPr lang="en-PH"/>
           </a:p>
@@ -3438,7 +3438,7 @@
           <a:p>
             <a:fld id="{0CCF0B81-6BD8-4C65-9459-815598C5F1F4}" type="datetimeFigureOut">
               <a:rPr lang="en-PH" smtClean="0"/>
-              <a:t>28/02/2023</a:t>
+              <a:t>06/03/2023</a:t>
             </a:fld>
             <a:endParaRPr lang="en-PH"/>
           </a:p>
@@ -3727,7 +3727,7 @@
           <a:p>
             <a:fld id="{0CCF0B81-6BD8-4C65-9459-815598C5F1F4}" type="datetimeFigureOut">
               <a:rPr lang="en-PH" smtClean="0"/>
-              <a:t>28/02/2023</a:t>
+              <a:t>06/03/2023</a:t>
             </a:fld>
             <a:endParaRPr lang="en-PH"/>
           </a:p>
@@ -3970,7 +3970,7 @@
           <a:p>
             <a:fld id="{0CCF0B81-6BD8-4C65-9459-815598C5F1F4}" type="datetimeFigureOut">
               <a:rPr lang="en-PH" smtClean="0"/>
-              <a:t>28/02/2023</a:t>
+              <a:t>06/03/2023</a:t>
             </a:fld>
             <a:endParaRPr lang="en-PH"/>
           </a:p>
@@ -5709,7 +5709,15 @@
             </a:pPr>
             <a:r>
               <a:rPr lang="en-US" sz="2500" dirty="0"/>
-              <a:t>Code synchronization helps in preventing multiple threads executing a code simultaneously.</a:t>
+              <a:t>Code synchronization helps in preventing multiple threads executing the </a:t>
+            </a:r>
+            <a:r>
+              <a:rPr lang="en-US" sz="2500"/>
+              <a:t>same method simultaneously</a:t>
+            </a:r>
+            <a:r>
+              <a:rPr lang="en-US" sz="2500" dirty="0"/>
+              <a:t>.</a:t>
             </a:r>
           </a:p>
           <a:p>

</xml_diff>

<commit_message>
Added illustration of thread synchronization
</commit_message>
<xml_diff>
--- a/week_12/Thread Synchronization.pptx
+++ b/week_12/Thread Synchronization.pptx
@@ -5,16 +5,18 @@
     <p:sldMasterId id="2147483648" r:id="rId1"/>
   </p:sldMasterIdLst>
   <p:notesMasterIdLst>
-    <p:notesMasterId r:id="rId9"/>
+    <p:notesMasterId r:id="rId11"/>
   </p:notesMasterIdLst>
   <p:sldIdLst>
     <p:sldId id="257" r:id="rId2"/>
     <p:sldId id="317" r:id="rId3"/>
     <p:sldId id="318" r:id="rId4"/>
-    <p:sldId id="319" r:id="rId5"/>
-    <p:sldId id="320" r:id="rId6"/>
-    <p:sldId id="321" r:id="rId7"/>
-    <p:sldId id="322" r:id="rId8"/>
+    <p:sldId id="323" r:id="rId5"/>
+    <p:sldId id="324" r:id="rId6"/>
+    <p:sldId id="319" r:id="rId7"/>
+    <p:sldId id="320" r:id="rId8"/>
+    <p:sldId id="321" r:id="rId9"/>
+    <p:sldId id="322" r:id="rId10"/>
   </p:sldIdLst>
   <p:sldSz cx="12192000" cy="6858000"/>
   <p:notesSz cx="6858000" cy="9144000"/>
@@ -211,7 +213,7 @@
           <a:p>
             <a:fld id="{F666E1FD-E7A0-497B-BBC0-740BAAC97C64}" type="datetimeFigureOut">
               <a:rPr lang="en-PH" smtClean="0"/>
-              <a:t>06/03/2023</a:t>
+              <a:t>07/03/2023</a:t>
             </a:fld>
             <a:endParaRPr lang="en-PH"/>
           </a:p>
@@ -805,7 +807,7 @@
     </p:spTree>
     <p:extLst>
       <p:ext uri="{BB962C8B-B14F-4D97-AF65-F5344CB8AC3E}">
-        <p14:creationId xmlns:p14="http://schemas.microsoft.com/office/powerpoint/2010/main" val="1631429847"/>
+        <p14:creationId xmlns:p14="http://schemas.microsoft.com/office/powerpoint/2010/main" val="2223345729"/>
       </p:ext>
     </p:extLst>
   </p:cSld>
@@ -889,7 +891,7 @@
     </p:spTree>
     <p:extLst>
       <p:ext uri="{BB962C8B-B14F-4D97-AF65-F5344CB8AC3E}">
-        <p14:creationId xmlns:p14="http://schemas.microsoft.com/office/powerpoint/2010/main" val="3406486750"/>
+        <p14:creationId xmlns:p14="http://schemas.microsoft.com/office/powerpoint/2010/main" val="3781793736"/>
       </p:ext>
     </p:extLst>
   </p:cSld>
@@ -973,7 +975,7 @@
     </p:spTree>
     <p:extLst>
       <p:ext uri="{BB962C8B-B14F-4D97-AF65-F5344CB8AC3E}">
-        <p14:creationId xmlns:p14="http://schemas.microsoft.com/office/powerpoint/2010/main" val="3749190231"/>
+        <p14:creationId xmlns:p14="http://schemas.microsoft.com/office/powerpoint/2010/main" val="1631429847"/>
       </p:ext>
     </p:extLst>
   </p:cSld>
@@ -1049,6 +1051,174 @@
             <a:fld id="{FE90CCE9-4AAE-4E1F-85AD-521A406D6524}" type="slidenum">
               <a:rPr lang="en-PH" smtClean="0"/>
               <a:t>7</a:t>
+            </a:fld>
+            <a:endParaRPr lang="en-PH"/>
+          </a:p>
+        </p:txBody>
+      </p:sp>
+    </p:spTree>
+    <p:extLst>
+      <p:ext uri="{BB962C8B-B14F-4D97-AF65-F5344CB8AC3E}">
+        <p14:creationId xmlns:p14="http://schemas.microsoft.com/office/powerpoint/2010/main" val="3406486750"/>
+      </p:ext>
+    </p:extLst>
+  </p:cSld>
+  <p:clrMapOvr>
+    <a:masterClrMapping/>
+  </p:clrMapOvr>
+</p:notes>
+</file>
+
+<file path=ppt/notesSlides/notesSlide8.xml><?xml version="1.0" encoding="utf-8"?>
+<p:notes xmlns:a="http://schemas.openxmlformats.org/drawingml/2006/main" xmlns:r="http://schemas.openxmlformats.org/officeDocument/2006/relationships" xmlns:p="http://schemas.openxmlformats.org/presentationml/2006/main">
+  <p:cSld>
+    <p:spTree>
+      <p:nvGrpSpPr>
+        <p:cNvPr id="1" name=""/>
+        <p:cNvGrpSpPr/>
+        <p:nvPr/>
+      </p:nvGrpSpPr>
+      <p:grpSpPr>
+        <a:xfrm>
+          <a:off x="0" y="0"/>
+          <a:ext cx="0" cy="0"/>
+          <a:chOff x="0" y="0"/>
+          <a:chExt cx="0" cy="0"/>
+        </a:xfrm>
+      </p:grpSpPr>
+      <p:sp>
+        <p:nvSpPr>
+          <p:cNvPr id="2" name="Slide Image Placeholder 1"/>
+          <p:cNvSpPr>
+            <a:spLocks noGrp="1" noRot="1" noChangeAspect="1"/>
+          </p:cNvSpPr>
+          <p:nvPr>
+            <p:ph type="sldImg"/>
+          </p:nvPr>
+        </p:nvSpPr>
+        <p:spPr/>
+      </p:sp>
+      <p:sp>
+        <p:nvSpPr>
+          <p:cNvPr id="3" name="Notes Placeholder 2"/>
+          <p:cNvSpPr>
+            <a:spLocks noGrp="1"/>
+          </p:cNvSpPr>
+          <p:nvPr>
+            <p:ph type="body" idx="1"/>
+          </p:nvPr>
+        </p:nvSpPr>
+        <p:spPr/>
+        <p:txBody>
+          <a:bodyPr/>
+          <a:lstStyle/>
+          <a:p>
+            <a:endParaRPr lang="en-PH" dirty="0"/>
+          </a:p>
+        </p:txBody>
+      </p:sp>
+      <p:sp>
+        <p:nvSpPr>
+          <p:cNvPr id="4" name="Slide Number Placeholder 3"/>
+          <p:cNvSpPr>
+            <a:spLocks noGrp="1"/>
+          </p:cNvSpPr>
+          <p:nvPr>
+            <p:ph type="sldNum" sz="quarter" idx="5"/>
+          </p:nvPr>
+        </p:nvSpPr>
+        <p:spPr/>
+        <p:txBody>
+          <a:bodyPr/>
+          <a:lstStyle/>
+          <a:p>
+            <a:fld id="{FE90CCE9-4AAE-4E1F-85AD-521A406D6524}" type="slidenum">
+              <a:rPr lang="en-PH" smtClean="0"/>
+              <a:t>8</a:t>
+            </a:fld>
+            <a:endParaRPr lang="en-PH"/>
+          </a:p>
+        </p:txBody>
+      </p:sp>
+    </p:spTree>
+    <p:extLst>
+      <p:ext uri="{BB962C8B-B14F-4D97-AF65-F5344CB8AC3E}">
+        <p14:creationId xmlns:p14="http://schemas.microsoft.com/office/powerpoint/2010/main" val="3749190231"/>
+      </p:ext>
+    </p:extLst>
+  </p:cSld>
+  <p:clrMapOvr>
+    <a:masterClrMapping/>
+  </p:clrMapOvr>
+</p:notes>
+</file>
+
+<file path=ppt/notesSlides/notesSlide9.xml><?xml version="1.0" encoding="utf-8"?>
+<p:notes xmlns:a="http://schemas.openxmlformats.org/drawingml/2006/main" xmlns:r="http://schemas.openxmlformats.org/officeDocument/2006/relationships" xmlns:p="http://schemas.openxmlformats.org/presentationml/2006/main">
+  <p:cSld>
+    <p:spTree>
+      <p:nvGrpSpPr>
+        <p:cNvPr id="1" name=""/>
+        <p:cNvGrpSpPr/>
+        <p:nvPr/>
+      </p:nvGrpSpPr>
+      <p:grpSpPr>
+        <a:xfrm>
+          <a:off x="0" y="0"/>
+          <a:ext cx="0" cy="0"/>
+          <a:chOff x="0" y="0"/>
+          <a:chExt cx="0" cy="0"/>
+        </a:xfrm>
+      </p:grpSpPr>
+      <p:sp>
+        <p:nvSpPr>
+          <p:cNvPr id="2" name="Slide Image Placeholder 1"/>
+          <p:cNvSpPr>
+            <a:spLocks noGrp="1" noRot="1" noChangeAspect="1"/>
+          </p:cNvSpPr>
+          <p:nvPr>
+            <p:ph type="sldImg"/>
+          </p:nvPr>
+        </p:nvSpPr>
+        <p:spPr/>
+      </p:sp>
+      <p:sp>
+        <p:nvSpPr>
+          <p:cNvPr id="3" name="Notes Placeholder 2"/>
+          <p:cNvSpPr>
+            <a:spLocks noGrp="1"/>
+          </p:cNvSpPr>
+          <p:nvPr>
+            <p:ph type="body" idx="1"/>
+          </p:nvPr>
+        </p:nvSpPr>
+        <p:spPr/>
+        <p:txBody>
+          <a:bodyPr/>
+          <a:lstStyle/>
+          <a:p>
+            <a:endParaRPr lang="en-PH" dirty="0"/>
+          </a:p>
+        </p:txBody>
+      </p:sp>
+      <p:sp>
+        <p:nvSpPr>
+          <p:cNvPr id="4" name="Slide Number Placeholder 3"/>
+          <p:cNvSpPr>
+            <a:spLocks noGrp="1"/>
+          </p:cNvSpPr>
+          <p:nvPr>
+            <p:ph type="sldNum" sz="quarter" idx="5"/>
+          </p:nvPr>
+        </p:nvSpPr>
+        <p:spPr/>
+        <p:txBody>
+          <a:bodyPr/>
+          <a:lstStyle/>
+          <a:p>
+            <a:fld id="{FE90CCE9-4AAE-4E1F-85AD-521A406D6524}" type="slidenum">
+              <a:rPr lang="en-PH" smtClean="0"/>
+              <a:t>9</a:t>
             </a:fld>
             <a:endParaRPr lang="en-PH"/>
           </a:p>
@@ -1216,7 +1386,7 @@
           <a:p>
             <a:fld id="{0CCF0B81-6BD8-4C65-9459-815598C5F1F4}" type="datetimeFigureOut">
               <a:rPr lang="en-PH" smtClean="0"/>
-              <a:t>06/03/2023</a:t>
+              <a:t>07/03/2023</a:t>
             </a:fld>
             <a:endParaRPr lang="en-PH"/>
           </a:p>
@@ -1416,7 +1586,7 @@
           <a:p>
             <a:fld id="{0CCF0B81-6BD8-4C65-9459-815598C5F1F4}" type="datetimeFigureOut">
               <a:rPr lang="en-PH" smtClean="0"/>
-              <a:t>06/03/2023</a:t>
+              <a:t>07/03/2023</a:t>
             </a:fld>
             <a:endParaRPr lang="en-PH"/>
           </a:p>
@@ -1626,7 +1796,7 @@
           <a:p>
             <a:fld id="{0CCF0B81-6BD8-4C65-9459-815598C5F1F4}" type="datetimeFigureOut">
               <a:rPr lang="en-PH" smtClean="0"/>
-              <a:t>06/03/2023</a:t>
+              <a:t>07/03/2023</a:t>
             </a:fld>
             <a:endParaRPr lang="en-PH"/>
           </a:p>
@@ -1826,7 +1996,7 @@
           <a:p>
             <a:fld id="{0CCF0B81-6BD8-4C65-9459-815598C5F1F4}" type="datetimeFigureOut">
               <a:rPr lang="en-PH" smtClean="0"/>
-              <a:t>06/03/2023</a:t>
+              <a:t>07/03/2023</a:t>
             </a:fld>
             <a:endParaRPr lang="en-PH"/>
           </a:p>
@@ -2102,7 +2272,7 @@
           <a:p>
             <a:fld id="{0CCF0B81-6BD8-4C65-9459-815598C5F1F4}" type="datetimeFigureOut">
               <a:rPr lang="en-PH" smtClean="0"/>
-              <a:t>06/03/2023</a:t>
+              <a:t>07/03/2023</a:t>
             </a:fld>
             <a:endParaRPr lang="en-PH"/>
           </a:p>
@@ -2370,7 +2540,7 @@
           <a:p>
             <a:fld id="{0CCF0B81-6BD8-4C65-9459-815598C5F1F4}" type="datetimeFigureOut">
               <a:rPr lang="en-PH" smtClean="0"/>
-              <a:t>06/03/2023</a:t>
+              <a:t>07/03/2023</a:t>
             </a:fld>
             <a:endParaRPr lang="en-PH"/>
           </a:p>
@@ -2785,7 +2955,7 @@
           <a:p>
             <a:fld id="{0CCF0B81-6BD8-4C65-9459-815598C5F1F4}" type="datetimeFigureOut">
               <a:rPr lang="en-PH" smtClean="0"/>
-              <a:t>06/03/2023</a:t>
+              <a:t>07/03/2023</a:t>
             </a:fld>
             <a:endParaRPr lang="en-PH"/>
           </a:p>
@@ -2927,7 +3097,7 @@
           <a:p>
             <a:fld id="{0CCF0B81-6BD8-4C65-9459-815598C5F1F4}" type="datetimeFigureOut">
               <a:rPr lang="en-PH" smtClean="0"/>
-              <a:t>06/03/2023</a:t>
+              <a:t>07/03/2023</a:t>
             </a:fld>
             <a:endParaRPr lang="en-PH"/>
           </a:p>
@@ -3040,7 +3210,7 @@
           <a:p>
             <a:fld id="{0CCF0B81-6BD8-4C65-9459-815598C5F1F4}" type="datetimeFigureOut">
               <a:rPr lang="en-PH" smtClean="0"/>
-              <a:t>06/03/2023</a:t>
+              <a:t>07/03/2023</a:t>
             </a:fld>
             <a:endParaRPr lang="en-PH"/>
           </a:p>
@@ -3353,7 +3523,7 @@
           <a:p>
             <a:fld id="{0CCF0B81-6BD8-4C65-9459-815598C5F1F4}" type="datetimeFigureOut">
               <a:rPr lang="en-PH" smtClean="0"/>
-              <a:t>06/03/2023</a:t>
+              <a:t>07/03/2023</a:t>
             </a:fld>
             <a:endParaRPr lang="en-PH"/>
           </a:p>
@@ -3642,7 +3812,7 @@
           <a:p>
             <a:fld id="{0CCF0B81-6BD8-4C65-9459-815598C5F1F4}" type="datetimeFigureOut">
               <a:rPr lang="en-PH" smtClean="0"/>
-              <a:t>06/03/2023</a:t>
+              <a:t>07/03/2023</a:t>
             </a:fld>
             <a:endParaRPr lang="en-PH"/>
           </a:p>
@@ -3885,7 +4055,7 @@
           <a:p>
             <a:fld id="{0CCF0B81-6BD8-4C65-9459-815598C5F1F4}" type="datetimeFigureOut">
               <a:rPr lang="en-PH" smtClean="0"/>
-              <a:t>06/03/2023</a:t>
+              <a:t>07/03/2023</a:t>
             </a:fld>
             <a:endParaRPr lang="en-PH"/>
           </a:p>
@@ -5829,6 +5999,1518 @@
           <a:p>
             <a:r>
               <a:rPr lang="en-PH" b="1" dirty="0"/>
+              <a:t>Without Synchronization</a:t>
+            </a:r>
+          </a:p>
+        </p:txBody>
+      </p:sp>
+      <p:sp>
+        <p:nvSpPr>
+          <p:cNvPr id="5" name="Rectangle 4">
+            <a:extLst>
+              <a:ext uri="{FF2B5EF4-FFF2-40B4-BE49-F238E27FC236}">
+                <a16:creationId xmlns:a16="http://schemas.microsoft.com/office/drawing/2014/main" id="{457A2328-3B86-14CA-75F1-B5A34CAEF00F}"/>
+              </a:ext>
+            </a:extLst>
+          </p:cNvPr>
+          <p:cNvSpPr/>
+          <p:nvPr/>
+        </p:nvSpPr>
+        <p:spPr>
+          <a:xfrm>
+            <a:off x="8899742" y="1801802"/>
+            <a:ext cx="1365337" cy="3551129"/>
+          </a:xfrm>
+          <a:prstGeom prst="rect">
+            <a:avLst/>
+          </a:prstGeom>
+        </p:spPr>
+        <p:style>
+          <a:lnRef idx="3">
+            <a:schemeClr val="lt1"/>
+          </a:lnRef>
+          <a:fillRef idx="1">
+            <a:schemeClr val="accent5"/>
+          </a:fillRef>
+          <a:effectRef idx="1">
+            <a:schemeClr val="accent5"/>
+          </a:effectRef>
+          <a:fontRef idx="minor">
+            <a:schemeClr val="lt1"/>
+          </a:fontRef>
+        </p:style>
+        <p:txBody>
+          <a:bodyPr rtlCol="0" anchor="ctr"/>
+          <a:lstStyle/>
+          <a:p>
+            <a:pPr algn="ctr"/>
+            <a:r>
+              <a:rPr lang="en-PH" dirty="0"/>
+              <a:t>Register()</a:t>
+            </a:r>
+          </a:p>
+        </p:txBody>
+      </p:sp>
+      <p:sp>
+        <p:nvSpPr>
+          <p:cNvPr id="7" name="Rectangle 6">
+            <a:extLst>
+              <a:ext uri="{FF2B5EF4-FFF2-40B4-BE49-F238E27FC236}">
+                <a16:creationId xmlns:a16="http://schemas.microsoft.com/office/drawing/2014/main" id="{1E3C7F00-B365-B089-7A2F-6F2F6355998F}"/>
+              </a:ext>
+            </a:extLst>
+          </p:cNvPr>
+          <p:cNvSpPr/>
+          <p:nvPr/>
+        </p:nvSpPr>
+        <p:spPr>
+          <a:xfrm>
+            <a:off x="670142" y="4523837"/>
+            <a:ext cx="1609595" cy="503575"/>
+          </a:xfrm>
+          <a:prstGeom prst="rect">
+            <a:avLst/>
+          </a:prstGeom>
+        </p:spPr>
+        <p:style>
+          <a:lnRef idx="3">
+            <a:schemeClr val="lt1"/>
+          </a:lnRef>
+          <a:fillRef idx="1">
+            <a:schemeClr val="accent2"/>
+          </a:fillRef>
+          <a:effectRef idx="1">
+            <a:schemeClr val="accent2"/>
+          </a:effectRef>
+          <a:fontRef idx="minor">
+            <a:schemeClr val="lt1"/>
+          </a:fontRef>
+        </p:style>
+        <p:txBody>
+          <a:bodyPr rtlCol="0" anchor="ctr"/>
+          <a:lstStyle/>
+          <a:p>
+            <a:pPr algn="ctr"/>
+            <a:endParaRPr lang="en-PH" dirty="0"/>
+          </a:p>
+          <a:p>
+            <a:pPr algn="ctr"/>
+            <a:r>
+              <a:rPr lang="en-PH" dirty="0"/>
+              <a:t>Student 2</a:t>
+            </a:r>
+          </a:p>
+          <a:p>
+            <a:pPr algn="ctr"/>
+            <a:endParaRPr lang="en-PH" dirty="0"/>
+          </a:p>
+        </p:txBody>
+      </p:sp>
+      <p:sp>
+        <p:nvSpPr>
+          <p:cNvPr id="8" name="Arrow: Right 7">
+            <a:extLst>
+              <a:ext uri="{FF2B5EF4-FFF2-40B4-BE49-F238E27FC236}">
+                <a16:creationId xmlns:a16="http://schemas.microsoft.com/office/drawing/2014/main" id="{4CF45A47-D966-71D5-633C-18C7C442633A}"/>
+              </a:ext>
+            </a:extLst>
+          </p:cNvPr>
+          <p:cNvSpPr/>
+          <p:nvPr/>
+        </p:nvSpPr>
+        <p:spPr>
+          <a:xfrm>
+            <a:off x="2279736" y="2375618"/>
+            <a:ext cx="6620005" cy="484632"/>
+          </a:xfrm>
+          <a:prstGeom prst="rightArrow">
+            <a:avLst/>
+          </a:prstGeom>
+        </p:spPr>
+        <p:style>
+          <a:lnRef idx="2">
+            <a:schemeClr val="accent1">
+              <a:shade val="50000"/>
+            </a:schemeClr>
+          </a:lnRef>
+          <a:fillRef idx="1">
+            <a:schemeClr val="accent1"/>
+          </a:fillRef>
+          <a:effectRef idx="0">
+            <a:schemeClr val="accent1"/>
+          </a:effectRef>
+          <a:fontRef idx="minor">
+            <a:schemeClr val="lt1"/>
+          </a:fontRef>
+        </p:style>
+        <p:txBody>
+          <a:bodyPr rtlCol="0" anchor="ctr"/>
+          <a:lstStyle/>
+          <a:p>
+            <a:pPr algn="ctr"/>
+            <a:endParaRPr lang="en-PH"/>
+          </a:p>
+        </p:txBody>
+      </p:sp>
+      <p:sp>
+        <p:nvSpPr>
+          <p:cNvPr id="9" name="Arrow: Right 8">
+            <a:extLst>
+              <a:ext uri="{FF2B5EF4-FFF2-40B4-BE49-F238E27FC236}">
+                <a16:creationId xmlns:a16="http://schemas.microsoft.com/office/drawing/2014/main" id="{80D27998-1131-16B2-ECA3-66C2B4816AB1}"/>
+              </a:ext>
+            </a:extLst>
+          </p:cNvPr>
+          <p:cNvSpPr/>
+          <p:nvPr/>
+        </p:nvSpPr>
+        <p:spPr>
+          <a:xfrm>
+            <a:off x="2279735" y="4528832"/>
+            <a:ext cx="6620004" cy="484632"/>
+          </a:xfrm>
+          <a:prstGeom prst="rightArrow">
+            <a:avLst/>
+          </a:prstGeom>
+        </p:spPr>
+        <p:style>
+          <a:lnRef idx="2">
+            <a:schemeClr val="accent1">
+              <a:shade val="50000"/>
+            </a:schemeClr>
+          </a:lnRef>
+          <a:fillRef idx="1">
+            <a:schemeClr val="accent1"/>
+          </a:fillRef>
+          <a:effectRef idx="0">
+            <a:schemeClr val="accent1"/>
+          </a:effectRef>
+          <a:fontRef idx="minor">
+            <a:schemeClr val="lt1"/>
+          </a:fontRef>
+        </p:style>
+        <p:txBody>
+          <a:bodyPr rtlCol="0" anchor="ctr"/>
+          <a:lstStyle/>
+          <a:p>
+            <a:pPr algn="ctr"/>
+            <a:endParaRPr lang="en-PH"/>
+          </a:p>
+        </p:txBody>
+      </p:sp>
+      <p:sp>
+        <p:nvSpPr>
+          <p:cNvPr id="10" name="Rectangle 9">
+            <a:extLst>
+              <a:ext uri="{FF2B5EF4-FFF2-40B4-BE49-F238E27FC236}">
+                <a16:creationId xmlns:a16="http://schemas.microsoft.com/office/drawing/2014/main" id="{FD7F7B3C-E041-6768-E2C0-26245AADFB6C}"/>
+              </a:ext>
+            </a:extLst>
+          </p:cNvPr>
+          <p:cNvSpPr/>
+          <p:nvPr/>
+        </p:nvSpPr>
+        <p:spPr>
+          <a:xfrm>
+            <a:off x="670140" y="2366147"/>
+            <a:ext cx="1609595" cy="503575"/>
+          </a:xfrm>
+          <a:prstGeom prst="rect">
+            <a:avLst/>
+          </a:prstGeom>
+        </p:spPr>
+        <p:style>
+          <a:lnRef idx="2">
+            <a:schemeClr val="accent4">
+              <a:shade val="50000"/>
+            </a:schemeClr>
+          </a:lnRef>
+          <a:fillRef idx="1">
+            <a:schemeClr val="accent4"/>
+          </a:fillRef>
+          <a:effectRef idx="0">
+            <a:schemeClr val="accent4"/>
+          </a:effectRef>
+          <a:fontRef idx="minor">
+            <a:schemeClr val="lt1"/>
+          </a:fontRef>
+        </p:style>
+        <p:txBody>
+          <a:bodyPr rtlCol="0" anchor="ctr"/>
+          <a:lstStyle/>
+          <a:p>
+            <a:pPr algn="ctr"/>
+            <a:endParaRPr lang="en-PH" dirty="0"/>
+          </a:p>
+          <a:p>
+            <a:pPr algn="ctr"/>
+            <a:r>
+              <a:rPr lang="en-PH" dirty="0"/>
+              <a:t>Student 1</a:t>
+            </a:r>
+          </a:p>
+          <a:p>
+            <a:pPr algn="ctr"/>
+            <a:endParaRPr lang="en-PH" dirty="0"/>
+          </a:p>
+        </p:txBody>
+      </p:sp>
+      <p:sp>
+        <p:nvSpPr>
+          <p:cNvPr id="11" name="TextBox 10">
+            <a:extLst>
+              <a:ext uri="{FF2B5EF4-FFF2-40B4-BE49-F238E27FC236}">
+                <a16:creationId xmlns:a16="http://schemas.microsoft.com/office/drawing/2014/main" id="{C7123376-C259-908D-1F9A-F1F8F3E4CB48}"/>
+              </a:ext>
+            </a:extLst>
+          </p:cNvPr>
+          <p:cNvSpPr txBox="1"/>
+          <p:nvPr/>
+        </p:nvSpPr>
+        <p:spPr>
+          <a:xfrm>
+            <a:off x="4809994" y="2768204"/>
+            <a:ext cx="1023678" cy="369332"/>
+          </a:xfrm>
+          <a:prstGeom prst="rect">
+            <a:avLst/>
+          </a:prstGeom>
+          <a:noFill/>
+        </p:spPr>
+        <p:txBody>
+          <a:bodyPr wrap="none" rtlCol="0">
+            <a:spAutoFit/>
+          </a:bodyPr>
+          <a:lstStyle/>
+          <a:p>
+            <a:r>
+              <a:rPr lang="en-PH" b="1" dirty="0"/>
+              <a:t>Thread</a:t>
+            </a:r>
+            <a:r>
+              <a:rPr lang="en-PH" dirty="0"/>
+              <a:t> 1</a:t>
+            </a:r>
+          </a:p>
+        </p:txBody>
+      </p:sp>
+      <p:sp>
+        <p:nvSpPr>
+          <p:cNvPr id="12" name="TextBox 11">
+            <a:extLst>
+              <a:ext uri="{FF2B5EF4-FFF2-40B4-BE49-F238E27FC236}">
+                <a16:creationId xmlns:a16="http://schemas.microsoft.com/office/drawing/2014/main" id="{17725164-D19C-E2B9-5495-C463EA04B657}"/>
+              </a:ext>
+            </a:extLst>
+          </p:cNvPr>
+          <p:cNvSpPr txBox="1"/>
+          <p:nvPr/>
+        </p:nvSpPr>
+        <p:spPr>
+          <a:xfrm>
+            <a:off x="4809994" y="4983599"/>
+            <a:ext cx="1023678" cy="369332"/>
+          </a:xfrm>
+          <a:prstGeom prst="rect">
+            <a:avLst/>
+          </a:prstGeom>
+          <a:noFill/>
+        </p:spPr>
+        <p:txBody>
+          <a:bodyPr wrap="none" rtlCol="0">
+            <a:spAutoFit/>
+          </a:bodyPr>
+          <a:lstStyle/>
+          <a:p>
+            <a:r>
+              <a:rPr lang="en-PH" b="1" dirty="0"/>
+              <a:t>Thread</a:t>
+            </a:r>
+            <a:r>
+              <a:rPr lang="en-PH" dirty="0"/>
+              <a:t> 2</a:t>
+            </a:r>
+          </a:p>
+        </p:txBody>
+      </p:sp>
+    </p:spTree>
+    <p:extLst>
+      <p:ext uri="{BB962C8B-B14F-4D97-AF65-F5344CB8AC3E}">
+        <p14:creationId xmlns:p14="http://schemas.microsoft.com/office/powerpoint/2010/main" val="3866185508"/>
+      </p:ext>
+    </p:extLst>
+  </p:cSld>
+  <p:clrMapOvr>
+    <a:masterClrMapping/>
+  </p:clrMapOvr>
+  <p:timing>
+    <p:tnLst>
+      <p:par>
+        <p:cTn id="1" dur="indefinite" restart="never" nodeType="tmRoot">
+          <p:childTnLst>
+            <p:seq concurrent="1" nextAc="seek">
+              <p:cTn id="2" dur="indefinite" nodeType="mainSeq">
+                <p:childTnLst>
+                  <p:par>
+                    <p:cTn id="3" fill="hold">
+                      <p:stCondLst>
+                        <p:cond delay="indefinite"/>
+                      </p:stCondLst>
+                      <p:childTnLst>
+                        <p:par>
+                          <p:cTn id="4" fill="hold">
+                            <p:stCondLst>
+                              <p:cond delay="0"/>
+                            </p:stCondLst>
+                            <p:childTnLst>
+                              <p:par>
+                                <p:cTn id="5" presetID="1" presetClass="emph" presetSubtype="2" fill="hold" grpId="0" nodeType="clickEffect">
+                                  <p:stCondLst>
+                                    <p:cond delay="0"/>
+                                  </p:stCondLst>
+                                  <p:childTnLst>
+                                    <p:animClr clrSpc="rgb" dir="cw">
+                                      <p:cBhvr>
+                                        <p:cTn id="6" dur="2000" fill="hold"/>
+                                        <p:tgtEl>
+                                          <p:spTgt spid="8"/>
+                                        </p:tgtEl>
+                                        <p:attrNameLst>
+                                          <p:attrName>fillcolor</p:attrName>
+                                        </p:attrNameLst>
+                                      </p:cBhvr>
+                                      <p:to>
+                                        <a:srgbClr val="00B050"/>
+                                      </p:to>
+                                    </p:animClr>
+                                    <p:set>
+                                      <p:cBhvr>
+                                        <p:cTn id="7" dur="2000" fill="hold"/>
+                                        <p:tgtEl>
+                                          <p:spTgt spid="8"/>
+                                        </p:tgtEl>
+                                        <p:attrNameLst>
+                                          <p:attrName>fill.type</p:attrName>
+                                        </p:attrNameLst>
+                                      </p:cBhvr>
+                                      <p:to>
+                                        <p:strVal val="solid"/>
+                                      </p:to>
+                                    </p:set>
+                                    <p:set>
+                                      <p:cBhvr>
+                                        <p:cTn id="8" dur="2000" fill="hold"/>
+                                        <p:tgtEl>
+                                          <p:spTgt spid="8"/>
+                                        </p:tgtEl>
+                                        <p:attrNameLst>
+                                          <p:attrName>fill.on</p:attrName>
+                                        </p:attrNameLst>
+                                      </p:cBhvr>
+                                      <p:to>
+                                        <p:strVal val="true"/>
+                                      </p:to>
+                                    </p:set>
+                                  </p:childTnLst>
+                                </p:cTn>
+                              </p:par>
+                              <p:par>
+                                <p:cTn id="9" presetID="1" presetClass="emph" presetSubtype="2" fill="hold" grpId="0" nodeType="withEffect">
+                                  <p:stCondLst>
+                                    <p:cond delay="0"/>
+                                  </p:stCondLst>
+                                  <p:childTnLst>
+                                    <p:animClr clrSpc="rgb" dir="cw">
+                                      <p:cBhvr>
+                                        <p:cTn id="10" dur="2000" fill="hold"/>
+                                        <p:tgtEl>
+                                          <p:spTgt spid="9"/>
+                                        </p:tgtEl>
+                                        <p:attrNameLst>
+                                          <p:attrName>fillcolor</p:attrName>
+                                        </p:attrNameLst>
+                                      </p:cBhvr>
+                                      <p:to>
+                                        <a:srgbClr val="00B050"/>
+                                      </p:to>
+                                    </p:animClr>
+                                    <p:set>
+                                      <p:cBhvr>
+                                        <p:cTn id="11" dur="2000" fill="hold"/>
+                                        <p:tgtEl>
+                                          <p:spTgt spid="9"/>
+                                        </p:tgtEl>
+                                        <p:attrNameLst>
+                                          <p:attrName>fill.type</p:attrName>
+                                        </p:attrNameLst>
+                                      </p:cBhvr>
+                                      <p:to>
+                                        <p:strVal val="solid"/>
+                                      </p:to>
+                                    </p:set>
+                                    <p:set>
+                                      <p:cBhvr>
+                                        <p:cTn id="12" dur="2000" fill="hold"/>
+                                        <p:tgtEl>
+                                          <p:spTgt spid="9"/>
+                                        </p:tgtEl>
+                                        <p:attrNameLst>
+                                          <p:attrName>fill.on</p:attrName>
+                                        </p:attrNameLst>
+                                      </p:cBhvr>
+                                      <p:to>
+                                        <p:strVal val="true"/>
+                                      </p:to>
+                                    </p:set>
+                                  </p:childTnLst>
+                                </p:cTn>
+                              </p:par>
+                            </p:childTnLst>
+                          </p:cTn>
+                        </p:par>
+                      </p:childTnLst>
+                    </p:cTn>
+                  </p:par>
+                  <p:par>
+                    <p:cTn id="13" fill="hold">
+                      <p:stCondLst>
+                        <p:cond delay="indefinite"/>
+                      </p:stCondLst>
+                      <p:childTnLst>
+                        <p:par>
+                          <p:cTn id="14" fill="hold">
+                            <p:stCondLst>
+                              <p:cond delay="0"/>
+                            </p:stCondLst>
+                            <p:childTnLst>
+                              <p:par>
+                                <p:cTn id="15" presetID="1" presetClass="emph" presetSubtype="2" fill="hold" nodeType="clickEffect">
+                                  <p:stCondLst>
+                                    <p:cond delay="0"/>
+                                  </p:stCondLst>
+                                  <p:childTnLst>
+                                    <p:animClr clrSpc="rgb" dir="cw">
+                                      <p:cBhvr>
+                                        <p:cTn id="16" dur="2000" fill="hold"/>
+                                        <p:tgtEl>
+                                          <p:spTgt spid="5"/>
+                                        </p:tgtEl>
+                                        <p:attrNameLst>
+                                          <p:attrName>fillcolor</p:attrName>
+                                        </p:attrNameLst>
+                                      </p:cBhvr>
+                                      <p:to>
+                                        <a:srgbClr val="FF0000"/>
+                                      </p:to>
+                                    </p:animClr>
+                                    <p:set>
+                                      <p:cBhvr>
+                                        <p:cTn id="17" dur="2000" fill="hold"/>
+                                        <p:tgtEl>
+                                          <p:spTgt spid="5"/>
+                                        </p:tgtEl>
+                                        <p:attrNameLst>
+                                          <p:attrName>fill.type</p:attrName>
+                                        </p:attrNameLst>
+                                      </p:cBhvr>
+                                      <p:to>
+                                        <p:strVal val="solid"/>
+                                      </p:to>
+                                    </p:set>
+                                    <p:set>
+                                      <p:cBhvr>
+                                        <p:cTn id="18" dur="2000" fill="hold"/>
+                                        <p:tgtEl>
+                                          <p:spTgt spid="5"/>
+                                        </p:tgtEl>
+                                        <p:attrNameLst>
+                                          <p:attrName>fill.on</p:attrName>
+                                        </p:attrNameLst>
+                                      </p:cBhvr>
+                                      <p:to>
+                                        <p:strVal val="true"/>
+                                      </p:to>
+                                    </p:set>
+                                  </p:childTnLst>
+                                </p:cTn>
+                              </p:par>
+                            </p:childTnLst>
+                          </p:cTn>
+                        </p:par>
+                      </p:childTnLst>
+                    </p:cTn>
+                  </p:par>
+                </p:childTnLst>
+              </p:cTn>
+              <p:prevCondLst>
+                <p:cond evt="onPrev" delay="0">
+                  <p:tgtEl>
+                    <p:sldTgt/>
+                  </p:tgtEl>
+                </p:cond>
+              </p:prevCondLst>
+              <p:nextCondLst>
+                <p:cond evt="onNext" delay="0">
+                  <p:tgtEl>
+                    <p:sldTgt/>
+                  </p:tgtEl>
+                </p:cond>
+              </p:nextCondLst>
+            </p:seq>
+          </p:childTnLst>
+        </p:cTn>
+      </p:par>
+    </p:tnLst>
+    <p:bldLst>
+      <p:bldP spid="8" grpId="0" animBg="1"/>
+      <p:bldP spid="9" grpId="0" animBg="1"/>
+    </p:bldLst>
+  </p:timing>
+</p:sld>
+</file>
+
+<file path=ppt/slides/slide5.xml><?xml version="1.0" encoding="utf-8"?>
+<p:sld xmlns:a="http://schemas.openxmlformats.org/drawingml/2006/main" xmlns:r="http://schemas.openxmlformats.org/officeDocument/2006/relationships" xmlns:p="http://schemas.openxmlformats.org/presentationml/2006/main">
+  <p:cSld>
+    <p:bg>
+      <p:bgPr>
+        <a:blipFill dpi="0" rotWithShape="1">
+          <a:blip r:embed="rId3">
+            <a:alphaModFix amt="99000"/>
+            <a:lum/>
+          </a:blip>
+          <a:srcRect/>
+          <a:stretch>
+            <a:fillRect t="89000" r="85000" b="-1000"/>
+          </a:stretch>
+        </a:blipFill>
+        <a:effectLst/>
+      </p:bgPr>
+    </p:bg>
+    <p:spTree>
+      <p:nvGrpSpPr>
+        <p:cNvPr id="1" name=""/>
+        <p:cNvGrpSpPr/>
+        <p:nvPr/>
+      </p:nvGrpSpPr>
+      <p:grpSpPr>
+        <a:xfrm>
+          <a:off x="0" y="0"/>
+          <a:ext cx="0" cy="0"/>
+          <a:chOff x="0" y="0"/>
+          <a:chExt cx="0" cy="0"/>
+        </a:xfrm>
+      </p:grpSpPr>
+      <p:sp>
+        <p:nvSpPr>
+          <p:cNvPr id="4" name="Footer Placeholder 3">
+            <a:extLst>
+              <a:ext uri="{FF2B5EF4-FFF2-40B4-BE49-F238E27FC236}">
+                <a16:creationId xmlns:a16="http://schemas.microsoft.com/office/drawing/2014/main" id="{638E7DE1-45EE-476A-A474-0F3C264AEDA3}"/>
+              </a:ext>
+            </a:extLst>
+          </p:cNvPr>
+          <p:cNvSpPr>
+            <a:spLocks noGrp="1"/>
+          </p:cNvSpPr>
+          <p:nvPr>
+            <p:ph type="ftr" sz="quarter" idx="11"/>
+          </p:nvPr>
+        </p:nvSpPr>
+        <p:spPr>
+          <a:xfrm>
+            <a:off x="0" y="6139541"/>
+            <a:ext cx="12192000" cy="718459"/>
+          </a:xfrm>
+          <a:ln w="28575">
+            <a:solidFill>
+              <a:schemeClr val="accent5">
+                <a:lumMod val="50000"/>
+              </a:schemeClr>
+            </a:solidFill>
+          </a:ln>
+        </p:spPr>
+        <p:txBody>
+          <a:bodyPr/>
+          <a:lstStyle/>
+          <a:p>
+            <a:pPr algn="r"/>
+            <a:r>
+              <a:rPr lang="en-PH" b="1">
+                <a:solidFill>
+                  <a:schemeClr val="tx1"/>
+                </a:solidFill>
+              </a:rPr>
+              <a:t>CCPRGG2L</a:t>
+            </a:r>
+            <a:endParaRPr lang="en-PH" dirty="0"/>
+          </a:p>
+        </p:txBody>
+      </p:sp>
+      <p:sp>
+        <p:nvSpPr>
+          <p:cNvPr id="2" name="Title 1">
+            <a:extLst>
+              <a:ext uri="{FF2B5EF4-FFF2-40B4-BE49-F238E27FC236}">
+                <a16:creationId xmlns:a16="http://schemas.microsoft.com/office/drawing/2014/main" id="{1C273836-F5C1-AD01-8E3E-0332B98CDB9F}"/>
+              </a:ext>
+            </a:extLst>
+          </p:cNvPr>
+          <p:cNvSpPr>
+            <a:spLocks noGrp="1"/>
+          </p:cNvSpPr>
+          <p:nvPr>
+            <p:ph type="ctrTitle"/>
+          </p:nvPr>
+        </p:nvSpPr>
+        <p:spPr>
+          <a:xfrm>
+            <a:off x="1524000" y="497150"/>
+            <a:ext cx="9144000" cy="718459"/>
+          </a:xfrm>
+        </p:spPr>
+        <p:txBody>
+          <a:bodyPr>
+            <a:normAutofit fontScale="90000"/>
+          </a:bodyPr>
+          <a:lstStyle/>
+          <a:p>
+            <a:r>
+              <a:rPr lang="en-PH" b="1" dirty="0"/>
+              <a:t>With Synchronization</a:t>
+            </a:r>
+          </a:p>
+        </p:txBody>
+      </p:sp>
+      <p:sp>
+        <p:nvSpPr>
+          <p:cNvPr id="5" name="Rectangle 4">
+            <a:extLst>
+              <a:ext uri="{FF2B5EF4-FFF2-40B4-BE49-F238E27FC236}">
+                <a16:creationId xmlns:a16="http://schemas.microsoft.com/office/drawing/2014/main" id="{457A2328-3B86-14CA-75F1-B5A34CAEF00F}"/>
+              </a:ext>
+            </a:extLst>
+          </p:cNvPr>
+          <p:cNvSpPr/>
+          <p:nvPr/>
+        </p:nvSpPr>
+        <p:spPr>
+          <a:xfrm>
+            <a:off x="8899742" y="1801802"/>
+            <a:ext cx="1365337" cy="3551129"/>
+          </a:xfrm>
+          <a:prstGeom prst="rect">
+            <a:avLst/>
+          </a:prstGeom>
+        </p:spPr>
+        <p:style>
+          <a:lnRef idx="3">
+            <a:schemeClr val="lt1"/>
+          </a:lnRef>
+          <a:fillRef idx="1">
+            <a:schemeClr val="accent5"/>
+          </a:fillRef>
+          <a:effectRef idx="1">
+            <a:schemeClr val="accent5"/>
+          </a:effectRef>
+          <a:fontRef idx="minor">
+            <a:schemeClr val="lt1"/>
+          </a:fontRef>
+        </p:style>
+        <p:txBody>
+          <a:bodyPr rtlCol="0" anchor="ctr"/>
+          <a:lstStyle/>
+          <a:p>
+            <a:pPr algn="ctr"/>
+            <a:r>
+              <a:rPr lang="en-PH" dirty="0"/>
+              <a:t>Register()</a:t>
+            </a:r>
+          </a:p>
+        </p:txBody>
+      </p:sp>
+      <p:sp>
+        <p:nvSpPr>
+          <p:cNvPr id="7" name="Rectangle 6">
+            <a:extLst>
+              <a:ext uri="{FF2B5EF4-FFF2-40B4-BE49-F238E27FC236}">
+                <a16:creationId xmlns:a16="http://schemas.microsoft.com/office/drawing/2014/main" id="{1E3C7F00-B365-B089-7A2F-6F2F6355998F}"/>
+              </a:ext>
+            </a:extLst>
+          </p:cNvPr>
+          <p:cNvSpPr/>
+          <p:nvPr/>
+        </p:nvSpPr>
+        <p:spPr>
+          <a:xfrm>
+            <a:off x="670142" y="4523837"/>
+            <a:ext cx="1609595" cy="503575"/>
+          </a:xfrm>
+          <a:prstGeom prst="rect">
+            <a:avLst/>
+          </a:prstGeom>
+        </p:spPr>
+        <p:style>
+          <a:lnRef idx="3">
+            <a:schemeClr val="lt1"/>
+          </a:lnRef>
+          <a:fillRef idx="1">
+            <a:schemeClr val="accent2"/>
+          </a:fillRef>
+          <a:effectRef idx="1">
+            <a:schemeClr val="accent2"/>
+          </a:effectRef>
+          <a:fontRef idx="minor">
+            <a:schemeClr val="lt1"/>
+          </a:fontRef>
+        </p:style>
+        <p:txBody>
+          <a:bodyPr rtlCol="0" anchor="ctr"/>
+          <a:lstStyle/>
+          <a:p>
+            <a:pPr algn="ctr"/>
+            <a:endParaRPr lang="en-PH" dirty="0"/>
+          </a:p>
+          <a:p>
+            <a:pPr algn="ctr"/>
+            <a:r>
+              <a:rPr lang="en-PH" dirty="0"/>
+              <a:t>Student 2</a:t>
+            </a:r>
+          </a:p>
+          <a:p>
+            <a:pPr algn="ctr"/>
+            <a:endParaRPr lang="en-PH" dirty="0"/>
+          </a:p>
+        </p:txBody>
+      </p:sp>
+      <p:sp>
+        <p:nvSpPr>
+          <p:cNvPr id="8" name="Arrow: Right 7">
+            <a:extLst>
+              <a:ext uri="{FF2B5EF4-FFF2-40B4-BE49-F238E27FC236}">
+                <a16:creationId xmlns:a16="http://schemas.microsoft.com/office/drawing/2014/main" id="{4CF45A47-D966-71D5-633C-18C7C442633A}"/>
+              </a:ext>
+            </a:extLst>
+          </p:cNvPr>
+          <p:cNvSpPr/>
+          <p:nvPr/>
+        </p:nvSpPr>
+        <p:spPr>
+          <a:xfrm>
+            <a:off x="2279736" y="2375618"/>
+            <a:ext cx="6620005" cy="484632"/>
+          </a:xfrm>
+          <a:prstGeom prst="rightArrow">
+            <a:avLst/>
+          </a:prstGeom>
+        </p:spPr>
+        <p:style>
+          <a:lnRef idx="2">
+            <a:schemeClr val="accent1">
+              <a:shade val="50000"/>
+            </a:schemeClr>
+          </a:lnRef>
+          <a:fillRef idx="1">
+            <a:schemeClr val="accent1"/>
+          </a:fillRef>
+          <a:effectRef idx="0">
+            <a:schemeClr val="accent1"/>
+          </a:effectRef>
+          <a:fontRef idx="minor">
+            <a:schemeClr val="lt1"/>
+          </a:fontRef>
+        </p:style>
+        <p:txBody>
+          <a:bodyPr rtlCol="0" anchor="ctr"/>
+          <a:lstStyle/>
+          <a:p>
+            <a:pPr algn="ctr"/>
+            <a:endParaRPr lang="en-PH"/>
+          </a:p>
+        </p:txBody>
+      </p:sp>
+      <p:sp>
+        <p:nvSpPr>
+          <p:cNvPr id="9" name="Arrow: Right 8">
+            <a:extLst>
+              <a:ext uri="{FF2B5EF4-FFF2-40B4-BE49-F238E27FC236}">
+                <a16:creationId xmlns:a16="http://schemas.microsoft.com/office/drawing/2014/main" id="{80D27998-1131-16B2-ECA3-66C2B4816AB1}"/>
+              </a:ext>
+            </a:extLst>
+          </p:cNvPr>
+          <p:cNvSpPr/>
+          <p:nvPr/>
+        </p:nvSpPr>
+        <p:spPr>
+          <a:xfrm>
+            <a:off x="2279735" y="4528832"/>
+            <a:ext cx="6620004" cy="484632"/>
+          </a:xfrm>
+          <a:prstGeom prst="rightArrow">
+            <a:avLst/>
+          </a:prstGeom>
+        </p:spPr>
+        <p:style>
+          <a:lnRef idx="2">
+            <a:schemeClr val="accent1">
+              <a:shade val="50000"/>
+            </a:schemeClr>
+          </a:lnRef>
+          <a:fillRef idx="1">
+            <a:schemeClr val="accent1"/>
+          </a:fillRef>
+          <a:effectRef idx="0">
+            <a:schemeClr val="accent1"/>
+          </a:effectRef>
+          <a:fontRef idx="minor">
+            <a:schemeClr val="lt1"/>
+          </a:fontRef>
+        </p:style>
+        <p:txBody>
+          <a:bodyPr rtlCol="0" anchor="ctr"/>
+          <a:lstStyle/>
+          <a:p>
+            <a:pPr algn="ctr"/>
+            <a:endParaRPr lang="en-PH"/>
+          </a:p>
+        </p:txBody>
+      </p:sp>
+      <p:sp>
+        <p:nvSpPr>
+          <p:cNvPr id="10" name="Rectangle 9">
+            <a:extLst>
+              <a:ext uri="{FF2B5EF4-FFF2-40B4-BE49-F238E27FC236}">
+                <a16:creationId xmlns:a16="http://schemas.microsoft.com/office/drawing/2014/main" id="{FD7F7B3C-E041-6768-E2C0-26245AADFB6C}"/>
+              </a:ext>
+            </a:extLst>
+          </p:cNvPr>
+          <p:cNvSpPr/>
+          <p:nvPr/>
+        </p:nvSpPr>
+        <p:spPr>
+          <a:xfrm>
+            <a:off x="670140" y="2366147"/>
+            <a:ext cx="1609595" cy="503575"/>
+          </a:xfrm>
+          <a:prstGeom prst="rect">
+            <a:avLst/>
+          </a:prstGeom>
+        </p:spPr>
+        <p:style>
+          <a:lnRef idx="2">
+            <a:schemeClr val="accent4">
+              <a:shade val="50000"/>
+            </a:schemeClr>
+          </a:lnRef>
+          <a:fillRef idx="1">
+            <a:schemeClr val="accent4"/>
+          </a:fillRef>
+          <a:effectRef idx="0">
+            <a:schemeClr val="accent4"/>
+          </a:effectRef>
+          <a:fontRef idx="minor">
+            <a:schemeClr val="lt1"/>
+          </a:fontRef>
+        </p:style>
+        <p:txBody>
+          <a:bodyPr rtlCol="0" anchor="ctr"/>
+          <a:lstStyle/>
+          <a:p>
+            <a:pPr algn="ctr"/>
+            <a:endParaRPr lang="en-PH" dirty="0"/>
+          </a:p>
+          <a:p>
+            <a:pPr algn="ctr"/>
+            <a:r>
+              <a:rPr lang="en-PH" dirty="0"/>
+              <a:t>Student 1</a:t>
+            </a:r>
+          </a:p>
+          <a:p>
+            <a:pPr algn="ctr"/>
+            <a:endParaRPr lang="en-PH" dirty="0"/>
+          </a:p>
+        </p:txBody>
+      </p:sp>
+      <p:sp>
+        <p:nvSpPr>
+          <p:cNvPr id="11" name="TextBox 10">
+            <a:extLst>
+              <a:ext uri="{FF2B5EF4-FFF2-40B4-BE49-F238E27FC236}">
+                <a16:creationId xmlns:a16="http://schemas.microsoft.com/office/drawing/2014/main" id="{C7123376-C259-908D-1F9A-F1F8F3E4CB48}"/>
+              </a:ext>
+            </a:extLst>
+          </p:cNvPr>
+          <p:cNvSpPr txBox="1"/>
+          <p:nvPr/>
+        </p:nvSpPr>
+        <p:spPr>
+          <a:xfrm>
+            <a:off x="4809994" y="2768204"/>
+            <a:ext cx="1023678" cy="369332"/>
+          </a:xfrm>
+          <a:prstGeom prst="rect">
+            <a:avLst/>
+          </a:prstGeom>
+          <a:noFill/>
+        </p:spPr>
+        <p:txBody>
+          <a:bodyPr wrap="none" rtlCol="0">
+            <a:spAutoFit/>
+          </a:bodyPr>
+          <a:lstStyle/>
+          <a:p>
+            <a:r>
+              <a:rPr lang="en-PH" b="1" dirty="0"/>
+              <a:t>Thread</a:t>
+            </a:r>
+            <a:r>
+              <a:rPr lang="en-PH" dirty="0"/>
+              <a:t> 1</a:t>
+            </a:r>
+          </a:p>
+        </p:txBody>
+      </p:sp>
+      <p:sp>
+        <p:nvSpPr>
+          <p:cNvPr id="12" name="TextBox 11">
+            <a:extLst>
+              <a:ext uri="{FF2B5EF4-FFF2-40B4-BE49-F238E27FC236}">
+                <a16:creationId xmlns:a16="http://schemas.microsoft.com/office/drawing/2014/main" id="{17725164-D19C-E2B9-5495-C463EA04B657}"/>
+              </a:ext>
+            </a:extLst>
+          </p:cNvPr>
+          <p:cNvSpPr txBox="1"/>
+          <p:nvPr/>
+        </p:nvSpPr>
+        <p:spPr>
+          <a:xfrm>
+            <a:off x="4809994" y="4983599"/>
+            <a:ext cx="1023678" cy="369332"/>
+          </a:xfrm>
+          <a:prstGeom prst="rect">
+            <a:avLst/>
+          </a:prstGeom>
+          <a:noFill/>
+        </p:spPr>
+        <p:txBody>
+          <a:bodyPr wrap="none" rtlCol="0">
+            <a:spAutoFit/>
+          </a:bodyPr>
+          <a:lstStyle/>
+          <a:p>
+            <a:r>
+              <a:rPr lang="en-PH" b="1" dirty="0"/>
+              <a:t>Thread</a:t>
+            </a:r>
+            <a:r>
+              <a:rPr lang="en-PH" dirty="0"/>
+              <a:t> 2</a:t>
+            </a:r>
+          </a:p>
+        </p:txBody>
+      </p:sp>
+      <p:pic>
+        <p:nvPicPr>
+          <p:cNvPr id="13" name="Picture 12" descr="Icon&#10;&#10;Description automatically generated">
+            <a:extLst>
+              <a:ext uri="{FF2B5EF4-FFF2-40B4-BE49-F238E27FC236}">
+                <a16:creationId xmlns:a16="http://schemas.microsoft.com/office/drawing/2014/main" id="{E7E1BABE-8497-248E-50A6-F6A82CC86F4D}"/>
+              </a:ext>
+            </a:extLst>
+          </p:cNvPr>
+          <p:cNvPicPr>
+            <a:picLocks noChangeAspect="1"/>
+          </p:cNvPicPr>
+          <p:nvPr/>
+        </p:nvPicPr>
+        <p:blipFill>
+          <a:blip r:embed="rId4">
+            <a:extLst>
+              <a:ext uri="{28A0092B-C50C-407E-A947-70E740481C1C}">
+                <a14:useLocalDpi xmlns:a14="http://schemas.microsoft.com/office/drawing/2010/main" val="0"/>
+              </a:ext>
+            </a:extLst>
+          </a:blip>
+          <a:stretch>
+            <a:fillRect/>
+          </a:stretch>
+        </p:blipFill>
+        <p:spPr>
+          <a:xfrm>
+            <a:off x="10450997" y="2967402"/>
+            <a:ext cx="1219928" cy="1219928"/>
+          </a:xfrm>
+          <a:prstGeom prst="rect">
+            <a:avLst/>
+          </a:prstGeom>
+        </p:spPr>
+      </p:pic>
+    </p:spTree>
+    <p:extLst>
+      <p:ext uri="{BB962C8B-B14F-4D97-AF65-F5344CB8AC3E}">
+        <p14:creationId xmlns:p14="http://schemas.microsoft.com/office/powerpoint/2010/main" val="67362560"/>
+      </p:ext>
+    </p:extLst>
+  </p:cSld>
+  <p:clrMapOvr>
+    <a:masterClrMapping/>
+  </p:clrMapOvr>
+  <p:timing>
+    <p:tnLst>
+      <p:par>
+        <p:cTn id="1" dur="indefinite" restart="never" nodeType="tmRoot">
+          <p:childTnLst>
+            <p:seq concurrent="1" nextAc="seek">
+              <p:cTn id="2" dur="indefinite" nodeType="mainSeq">
+                <p:childTnLst>
+                  <p:par>
+                    <p:cTn id="3" fill="hold">
+                      <p:stCondLst>
+                        <p:cond delay="indefinite"/>
+                      </p:stCondLst>
+                      <p:childTnLst>
+                        <p:par>
+                          <p:cTn id="4" fill="hold">
+                            <p:stCondLst>
+                              <p:cond delay="0"/>
+                            </p:stCondLst>
+                            <p:childTnLst>
+                              <p:par>
+                                <p:cTn id="5" presetID="1" presetClass="emph" presetSubtype="2" fill="hold" nodeType="clickEffect">
+                                  <p:stCondLst>
+                                    <p:cond delay="0"/>
+                                  </p:stCondLst>
+                                  <p:childTnLst>
+                                    <p:animClr clrSpc="rgb" dir="cw">
+                                      <p:cBhvr>
+                                        <p:cTn id="6" dur="2000" fill="hold"/>
+                                        <p:tgtEl>
+                                          <p:spTgt spid="8"/>
+                                        </p:tgtEl>
+                                        <p:attrNameLst>
+                                          <p:attrName>fillcolor</p:attrName>
+                                        </p:attrNameLst>
+                                      </p:cBhvr>
+                                      <p:to>
+                                        <a:srgbClr val="00B050"/>
+                                      </p:to>
+                                    </p:animClr>
+                                    <p:set>
+                                      <p:cBhvr>
+                                        <p:cTn id="7" dur="2000" fill="hold"/>
+                                        <p:tgtEl>
+                                          <p:spTgt spid="8"/>
+                                        </p:tgtEl>
+                                        <p:attrNameLst>
+                                          <p:attrName>fill.type</p:attrName>
+                                        </p:attrNameLst>
+                                      </p:cBhvr>
+                                      <p:to>
+                                        <p:strVal val="solid"/>
+                                      </p:to>
+                                    </p:set>
+                                    <p:set>
+                                      <p:cBhvr>
+                                        <p:cTn id="8" dur="2000" fill="hold"/>
+                                        <p:tgtEl>
+                                          <p:spTgt spid="8"/>
+                                        </p:tgtEl>
+                                        <p:attrNameLst>
+                                          <p:attrName>fill.on</p:attrName>
+                                        </p:attrNameLst>
+                                      </p:cBhvr>
+                                      <p:to>
+                                        <p:strVal val="true"/>
+                                      </p:to>
+                                    </p:set>
+                                  </p:childTnLst>
+                                </p:cTn>
+                              </p:par>
+                            </p:childTnLst>
+                          </p:cTn>
+                        </p:par>
+                      </p:childTnLst>
+                    </p:cTn>
+                  </p:par>
+                  <p:par>
+                    <p:cTn id="9" fill="hold">
+                      <p:stCondLst>
+                        <p:cond delay="indefinite"/>
+                      </p:stCondLst>
+                      <p:childTnLst>
+                        <p:par>
+                          <p:cTn id="10" fill="hold">
+                            <p:stCondLst>
+                              <p:cond delay="0"/>
+                            </p:stCondLst>
+                            <p:childTnLst>
+                              <p:par>
+                                <p:cTn id="11" presetID="1" presetClass="emph" presetSubtype="2" fill="hold" nodeType="clickEffect">
+                                  <p:stCondLst>
+                                    <p:cond delay="0"/>
+                                  </p:stCondLst>
+                                  <p:childTnLst>
+                                    <p:animClr clrSpc="rgb" dir="cw">
+                                      <p:cBhvr>
+                                        <p:cTn id="12" dur="2000" fill="hold"/>
+                                        <p:tgtEl>
+                                          <p:spTgt spid="5"/>
+                                        </p:tgtEl>
+                                        <p:attrNameLst>
+                                          <p:attrName>fillcolor</p:attrName>
+                                        </p:attrNameLst>
+                                      </p:cBhvr>
+                                      <p:to>
+                                        <a:srgbClr val="FF0000"/>
+                                      </p:to>
+                                    </p:animClr>
+                                    <p:set>
+                                      <p:cBhvr>
+                                        <p:cTn id="13" dur="2000" fill="hold"/>
+                                        <p:tgtEl>
+                                          <p:spTgt spid="5"/>
+                                        </p:tgtEl>
+                                        <p:attrNameLst>
+                                          <p:attrName>fill.type</p:attrName>
+                                        </p:attrNameLst>
+                                      </p:cBhvr>
+                                      <p:to>
+                                        <p:strVal val="solid"/>
+                                      </p:to>
+                                    </p:set>
+                                    <p:set>
+                                      <p:cBhvr>
+                                        <p:cTn id="14" dur="2000" fill="hold"/>
+                                        <p:tgtEl>
+                                          <p:spTgt spid="5"/>
+                                        </p:tgtEl>
+                                        <p:attrNameLst>
+                                          <p:attrName>fill.on</p:attrName>
+                                        </p:attrNameLst>
+                                      </p:cBhvr>
+                                      <p:to>
+                                        <p:strVal val="true"/>
+                                      </p:to>
+                                    </p:set>
+                                  </p:childTnLst>
+                                </p:cTn>
+                              </p:par>
+                            </p:childTnLst>
+                          </p:cTn>
+                        </p:par>
+                      </p:childTnLst>
+                    </p:cTn>
+                  </p:par>
+                  <p:par>
+                    <p:cTn id="15" fill="hold">
+                      <p:stCondLst>
+                        <p:cond delay="indefinite"/>
+                      </p:stCondLst>
+                      <p:childTnLst>
+                        <p:par>
+                          <p:cTn id="16" fill="hold">
+                            <p:stCondLst>
+                              <p:cond delay="0"/>
+                            </p:stCondLst>
+                            <p:childTnLst>
+                              <p:par>
+                                <p:cTn id="17" presetID="10" presetClass="entr" presetSubtype="0" fill="hold" nodeType="clickEffect">
+                                  <p:stCondLst>
+                                    <p:cond delay="0"/>
+                                  </p:stCondLst>
+                                  <p:childTnLst>
+                                    <p:set>
+                                      <p:cBhvr>
+                                        <p:cTn id="18" dur="1" fill="hold">
+                                          <p:stCondLst>
+                                            <p:cond delay="0"/>
+                                          </p:stCondLst>
+                                        </p:cTn>
+                                        <p:tgtEl>
+                                          <p:spTgt spid="13"/>
+                                        </p:tgtEl>
+                                        <p:attrNameLst>
+                                          <p:attrName>style.visibility</p:attrName>
+                                        </p:attrNameLst>
+                                      </p:cBhvr>
+                                      <p:to>
+                                        <p:strVal val="visible"/>
+                                      </p:to>
+                                    </p:set>
+                                    <p:animEffect transition="in" filter="fade">
+                                      <p:cBhvr>
+                                        <p:cTn id="19" dur="500"/>
+                                        <p:tgtEl>
+                                          <p:spTgt spid="13"/>
+                                        </p:tgtEl>
+                                      </p:cBhvr>
+                                    </p:animEffect>
+                                  </p:childTnLst>
+                                </p:cTn>
+                              </p:par>
+                            </p:childTnLst>
+                          </p:cTn>
+                        </p:par>
+                      </p:childTnLst>
+                    </p:cTn>
+                  </p:par>
+                  <p:par>
+                    <p:cTn id="20" fill="hold">
+                      <p:stCondLst>
+                        <p:cond delay="indefinite"/>
+                      </p:stCondLst>
+                      <p:childTnLst>
+                        <p:par>
+                          <p:cTn id="21" fill="hold">
+                            <p:stCondLst>
+                              <p:cond delay="0"/>
+                            </p:stCondLst>
+                            <p:childTnLst>
+                              <p:par>
+                                <p:cTn id="22" presetID="10" presetClass="exit" presetSubtype="0" fill="hold" nodeType="clickEffect">
+                                  <p:stCondLst>
+                                    <p:cond delay="0"/>
+                                  </p:stCondLst>
+                                  <p:childTnLst>
+                                    <p:animEffect transition="out" filter="fade">
+                                      <p:cBhvr>
+                                        <p:cTn id="23" dur="500"/>
+                                        <p:tgtEl>
+                                          <p:spTgt spid="13"/>
+                                        </p:tgtEl>
+                                      </p:cBhvr>
+                                    </p:animEffect>
+                                    <p:set>
+                                      <p:cBhvr>
+                                        <p:cTn id="24" dur="1" fill="hold">
+                                          <p:stCondLst>
+                                            <p:cond delay="499"/>
+                                          </p:stCondLst>
+                                        </p:cTn>
+                                        <p:tgtEl>
+                                          <p:spTgt spid="13"/>
+                                        </p:tgtEl>
+                                        <p:attrNameLst>
+                                          <p:attrName>style.visibility</p:attrName>
+                                        </p:attrNameLst>
+                                      </p:cBhvr>
+                                      <p:to>
+                                        <p:strVal val="hidden"/>
+                                      </p:to>
+                                    </p:set>
+                                  </p:childTnLst>
+                                </p:cTn>
+                              </p:par>
+                            </p:childTnLst>
+                          </p:cTn>
+                        </p:par>
+                      </p:childTnLst>
+                    </p:cTn>
+                  </p:par>
+                  <p:par>
+                    <p:cTn id="25" fill="hold">
+                      <p:stCondLst>
+                        <p:cond delay="indefinite"/>
+                      </p:stCondLst>
+                      <p:childTnLst>
+                        <p:par>
+                          <p:cTn id="26" fill="hold">
+                            <p:stCondLst>
+                              <p:cond delay="0"/>
+                            </p:stCondLst>
+                            <p:childTnLst>
+                              <p:par>
+                                <p:cTn id="27" presetID="1" presetClass="emph" presetSubtype="2" fill="hold" nodeType="clickEffect">
+                                  <p:stCondLst>
+                                    <p:cond delay="0"/>
+                                  </p:stCondLst>
+                                  <p:childTnLst>
+                                    <p:animClr clrSpc="rgb" dir="cw">
+                                      <p:cBhvr>
+                                        <p:cTn id="28" dur="2000" fill="hold"/>
+                                        <p:tgtEl>
+                                          <p:spTgt spid="9"/>
+                                        </p:tgtEl>
+                                        <p:attrNameLst>
+                                          <p:attrName>fillcolor</p:attrName>
+                                        </p:attrNameLst>
+                                      </p:cBhvr>
+                                      <p:to>
+                                        <a:srgbClr val="00B050"/>
+                                      </p:to>
+                                    </p:animClr>
+                                    <p:set>
+                                      <p:cBhvr>
+                                        <p:cTn id="29" dur="2000" fill="hold"/>
+                                        <p:tgtEl>
+                                          <p:spTgt spid="9"/>
+                                        </p:tgtEl>
+                                        <p:attrNameLst>
+                                          <p:attrName>fill.type</p:attrName>
+                                        </p:attrNameLst>
+                                      </p:cBhvr>
+                                      <p:to>
+                                        <p:strVal val="solid"/>
+                                      </p:to>
+                                    </p:set>
+                                    <p:set>
+                                      <p:cBhvr>
+                                        <p:cTn id="30" dur="2000" fill="hold"/>
+                                        <p:tgtEl>
+                                          <p:spTgt spid="9"/>
+                                        </p:tgtEl>
+                                        <p:attrNameLst>
+                                          <p:attrName>fill.on</p:attrName>
+                                        </p:attrNameLst>
+                                      </p:cBhvr>
+                                      <p:to>
+                                        <p:strVal val="true"/>
+                                      </p:to>
+                                    </p:set>
+                                  </p:childTnLst>
+                                </p:cTn>
+                              </p:par>
+                            </p:childTnLst>
+                          </p:cTn>
+                        </p:par>
+                      </p:childTnLst>
+                    </p:cTn>
+                  </p:par>
+                </p:childTnLst>
+              </p:cTn>
+              <p:prevCondLst>
+                <p:cond evt="onPrev" delay="0">
+                  <p:tgtEl>
+                    <p:sldTgt/>
+                  </p:tgtEl>
+                </p:cond>
+              </p:prevCondLst>
+              <p:nextCondLst>
+                <p:cond evt="onNext" delay="0">
+                  <p:tgtEl>
+                    <p:sldTgt/>
+                  </p:tgtEl>
+                </p:cond>
+              </p:nextCondLst>
+            </p:seq>
+          </p:childTnLst>
+        </p:cTn>
+      </p:par>
+    </p:tnLst>
+  </p:timing>
+</p:sld>
+</file>
+
+<file path=ppt/slides/slide6.xml><?xml version="1.0" encoding="utf-8"?>
+<p:sld xmlns:a="http://schemas.openxmlformats.org/drawingml/2006/main" xmlns:r="http://schemas.openxmlformats.org/officeDocument/2006/relationships" xmlns:p="http://schemas.openxmlformats.org/presentationml/2006/main">
+  <p:cSld>
+    <p:bg>
+      <p:bgPr>
+        <a:blipFill dpi="0" rotWithShape="1">
+          <a:blip r:embed="rId3">
+            <a:alphaModFix amt="99000"/>
+            <a:lum/>
+          </a:blip>
+          <a:srcRect/>
+          <a:stretch>
+            <a:fillRect t="89000" r="85000" b="-1000"/>
+          </a:stretch>
+        </a:blipFill>
+        <a:effectLst/>
+      </p:bgPr>
+    </p:bg>
+    <p:spTree>
+      <p:nvGrpSpPr>
+        <p:cNvPr id="1" name=""/>
+        <p:cNvGrpSpPr/>
+        <p:nvPr/>
+      </p:nvGrpSpPr>
+      <p:grpSpPr>
+        <a:xfrm>
+          <a:off x="0" y="0"/>
+          <a:ext cx="0" cy="0"/>
+          <a:chOff x="0" y="0"/>
+          <a:chExt cx="0" cy="0"/>
+        </a:xfrm>
+      </p:grpSpPr>
+      <p:sp>
+        <p:nvSpPr>
+          <p:cNvPr id="4" name="Footer Placeholder 3">
+            <a:extLst>
+              <a:ext uri="{FF2B5EF4-FFF2-40B4-BE49-F238E27FC236}">
+                <a16:creationId xmlns:a16="http://schemas.microsoft.com/office/drawing/2014/main" id="{638E7DE1-45EE-476A-A474-0F3C264AEDA3}"/>
+              </a:ext>
+            </a:extLst>
+          </p:cNvPr>
+          <p:cNvSpPr>
+            <a:spLocks noGrp="1"/>
+          </p:cNvSpPr>
+          <p:nvPr>
+            <p:ph type="ftr" sz="quarter" idx="11"/>
+          </p:nvPr>
+        </p:nvSpPr>
+        <p:spPr>
+          <a:xfrm>
+            <a:off x="0" y="6139541"/>
+            <a:ext cx="12192000" cy="718459"/>
+          </a:xfrm>
+          <a:ln w="28575">
+            <a:solidFill>
+              <a:schemeClr val="accent5">
+                <a:lumMod val="50000"/>
+              </a:schemeClr>
+            </a:solidFill>
+          </a:ln>
+        </p:spPr>
+        <p:txBody>
+          <a:bodyPr/>
+          <a:lstStyle/>
+          <a:p>
+            <a:pPr algn="r"/>
+            <a:r>
+              <a:rPr lang="en-PH" b="1">
+                <a:solidFill>
+                  <a:schemeClr val="tx1"/>
+                </a:solidFill>
+              </a:rPr>
+              <a:t>CCPRGG2L</a:t>
+            </a:r>
+            <a:endParaRPr lang="en-PH" dirty="0"/>
+          </a:p>
+        </p:txBody>
+      </p:sp>
+      <p:sp>
+        <p:nvSpPr>
+          <p:cNvPr id="2" name="Title 1">
+            <a:extLst>
+              <a:ext uri="{FF2B5EF4-FFF2-40B4-BE49-F238E27FC236}">
+                <a16:creationId xmlns:a16="http://schemas.microsoft.com/office/drawing/2014/main" id="{1C273836-F5C1-AD01-8E3E-0332B98CDB9F}"/>
+              </a:ext>
+            </a:extLst>
+          </p:cNvPr>
+          <p:cNvSpPr>
+            <a:spLocks noGrp="1"/>
+          </p:cNvSpPr>
+          <p:nvPr>
+            <p:ph type="ctrTitle"/>
+          </p:nvPr>
+        </p:nvSpPr>
+        <p:spPr>
+          <a:xfrm>
+            <a:off x="1524000" y="497150"/>
+            <a:ext cx="9144000" cy="718459"/>
+          </a:xfrm>
+        </p:spPr>
+        <p:txBody>
+          <a:bodyPr>
+            <a:normAutofit fontScale="90000"/>
+          </a:bodyPr>
+          <a:lstStyle/>
+          <a:p>
+            <a:r>
+              <a:rPr lang="en-PH" b="1" dirty="0"/>
               <a:t>Synchronization</a:t>
             </a:r>
           </a:p>
@@ -5917,7 +7599,7 @@
 </p:sld>
 </file>
 
-<file path=ppt/slides/slide5.xml><?xml version="1.0" encoding="utf-8"?>
+<file path=ppt/slides/slide7.xml><?xml version="1.0" encoding="utf-8"?>
 <p:sld xmlns:a="http://schemas.openxmlformats.org/drawingml/2006/main" xmlns:r="http://schemas.openxmlformats.org/officeDocument/2006/relationships" xmlns:p="http://schemas.openxmlformats.org/presentationml/2006/main">
   <p:cSld>
     <p:bg>
@@ -6471,7 +8153,7 @@
 </p:sld>
 </file>
 
-<file path=ppt/slides/slide6.xml><?xml version="1.0" encoding="utf-8"?>
+<file path=ppt/slides/slide8.xml><?xml version="1.0" encoding="utf-8"?>
 <p:sld xmlns:a="http://schemas.openxmlformats.org/drawingml/2006/main" xmlns:r="http://schemas.openxmlformats.org/officeDocument/2006/relationships" xmlns:p="http://schemas.openxmlformats.org/presentationml/2006/main">
   <p:cSld>
     <p:bg>
@@ -7025,7 +8707,7 @@
 </p:sld>
 </file>
 
-<file path=ppt/slides/slide7.xml><?xml version="1.0" encoding="utf-8"?>
+<file path=ppt/slides/slide9.xml><?xml version="1.0" encoding="utf-8"?>
 <p:sld xmlns:a="http://schemas.openxmlformats.org/drawingml/2006/main" xmlns:r="http://schemas.openxmlformats.org/officeDocument/2006/relationships" xmlns:p="http://schemas.openxmlformats.org/presentationml/2006/main">
   <p:cSld>
     <p:bg>

</xml_diff>